<commit_message>
Replace all article thumbnails with PPTX-sourced renders
Switched from pdftoppm (LibreOffice PDF) to macOS Quick Look native
rendering for all article cover images. PPTX is now the source of truth
for thumbnails, preserving correct fonts (Georgia italic, etc). Also
updates PM playbook to The 2026 PM final version.

Co-Authored-By: Claude Sonnet 4.6 <noreply@anthropic.com>
</commit_message>
<xml_diff>
--- a/public/pdfs/unlimited-dev-capacity-pm-playbook.pptx
+++ b/public/pdfs/unlimited-dev-capacity-pm-playbook.pptx
@@ -7161,8 +7161,8 @@
         </p:nvSpPr>
         <p:spPr>
           <a:xfrm>
-            <a:off x="731520" y="548640"/>
-            <a:ext cx="7680960" cy="2240280"/>
+            <a:off x="731520" y="365760"/>
+            <a:ext cx="7680960" cy="2194560"/>
           </a:xfrm>
           <a:prstGeom prst="rect">
             <a:avLst/>
@@ -7171,26 +7171,41 @@
           <a:ln/>
         </p:spPr>
         <p:txBody>
-          <a:bodyPr wrap="square" rtlCol="0" anchor="ctr"/>
-          <a:lstStyle/>
-          <a:p>
-            <a:pPr indent="0" marL="0">
-              <a:lnSpc>
-                <a:spcPct val="110000"/>
-              </a:lnSpc>
-              <a:buNone/>
-            </a:pPr>
-            <a:r>
-              <a:rPr sz="4800" i="1">
+          <a:bodyPr wrap="square" lIns="0" tIns="0" rIns="0" bIns="0" rtlCol="0" anchor="b"/>
+          <a:lstStyle/>
+          <a:p>
+            <a:pPr indent="0" marL="0">
+              <a:buNone/>
+            </a:pPr>
+            <a:r>
+              <a:rPr lang="en-US" sz="4200" i="1" dirty="0">
                 <a:solidFill>
                   <a:srgbClr val="FFFFFF"/>
                 </a:solidFill>
-                <a:latin typeface="Georgia"/>
-              </a:rPr>
-              <a:t>Unlimited Dev Capacity.
-The PM's Job in 2026.</a:t>
-            </a:r>
-            <a:endParaRPr lang="en-US" sz="3600" dirty="0"/>
+                <a:latin typeface="Georgia" pitchFamily="34" charset="0"/>
+                <a:ea typeface="Georgia" pitchFamily="34" charset="-122"/>
+                <a:cs typeface="Georgia" pitchFamily="34" charset="-120"/>
+              </a:rPr>
+              <a:t>Unlimited Dev Capacity:</a:t>
+            </a:r>
+            <a:endParaRPr lang="en-US" sz="4200" dirty="0"/>
+          </a:p>
+          <a:p>
+            <a:pPr indent="0" marL="0">
+              <a:buNone/>
+            </a:pPr>
+            <a:r>
+              <a:rPr lang="en-US" sz="4200" i="1" dirty="0">
+                <a:solidFill>
+                  <a:srgbClr val="FFFFFF"/>
+                </a:solidFill>
+                <a:latin typeface="Georgia" pitchFamily="34" charset="0"/>
+                <a:ea typeface="Georgia" pitchFamily="34" charset="-122"/>
+                <a:cs typeface="Georgia" pitchFamily="34" charset="-120"/>
+              </a:rPr>
+              <a:t>The Role of a PM in 2026</a:t>
+            </a:r>
+            <a:endParaRPr lang="en-US" sz="4200" dirty="0"/>
           </a:p>
         </p:txBody>
       </p:sp>
@@ -7423,7 +7438,7 @@
                 <a:ea typeface="Arial" pitchFamily="34" charset="-122"/>
                 <a:cs typeface="Arial" pitchFamily="34" charset="-120"/>
               </a:rPr>
-              <a:t>The Weekend Demo Problem. </a:t>
+              <a:t xml:space="preserve">The Weekend Demo Problem. </a:t>
             </a:r>
             <a:pPr indent="0" marL="0">
               <a:lnSpc>
@@ -7484,7 +7499,7 @@
                 <a:ea typeface="Arial" pitchFamily="34" charset="-122"/>
                 <a:cs typeface="Arial" pitchFamily="34" charset="-120"/>
               </a:rPr>
-              <a:t>This is the moment where product judgment either exists or it doesn't. </a:t>
+              <a:t xml:space="preserve">This is the moment where product judgment either exists or it doesn't. </a:t>
             </a:r>
             <a:pPr indent="0" marL="0">
               <a:lnSpc>
@@ -7613,7 +7628,7 @@
                 <a:ea typeface="Arial" pitchFamily="34" charset="-122"/>
                 <a:cs typeface="Arial" pitchFamily="34" charset="-120"/>
               </a:rPr>
-              <a:t>Layer 1: Market Signal. </a:t>
+              <a:t xml:space="preserve">Layer 1: Market Signal. </a:t>
             </a:r>
             <a:pPr indent="0" marL="0">
               <a:lnSpc>
@@ -7674,7 +7689,7 @@
                 <a:ea typeface="Arial" pitchFamily="34" charset="-122"/>
                 <a:cs typeface="Arial" pitchFamily="34" charset="-120"/>
               </a:rPr>
-              <a:t>Layer 2: Decision Architecture. </a:t>
+              <a:t xml:space="preserve">Layer 2: Decision Architecture. </a:t>
             </a:r>
             <a:pPr indent="0" marL="0">
               <a:lnSpc>
@@ -7803,7 +7818,7 @@
                 <a:ea typeface="Arial" pitchFamily="34" charset="-122"/>
                 <a:cs typeface="Arial" pitchFamily="34" charset="-120"/>
               </a:rPr>
-              <a:t>Layer 3: Build/Buy/Agent. </a:t>
+              <a:t xml:space="preserve">Layer 3: Build/Buy/Agent. </a:t>
             </a:r>
             <a:pPr indent="0" marL="0">
               <a:lnSpc>
@@ -7864,7 +7879,7 @@
                 <a:ea typeface="Arial" pitchFamily="34" charset="-122"/>
                 <a:cs typeface="Arial" pitchFamily="34" charset="-120"/>
               </a:rPr>
-              <a:t>Layer 4: Feedback Integrity. </a:t>
+              <a:t xml:space="preserve">Layer 4: Feedback Integrity. </a:t>
             </a:r>
             <a:pPr indent="0" marL="0">
               <a:lnSpc>
@@ -7993,7 +8008,7 @@
                 <a:ea typeface="Arial" pitchFamily="34" charset="-122"/>
                 <a:cs typeface="Arial" pitchFamily="34" charset="-120"/>
               </a:rPr>
-              <a:t>Using the Stack as a Diagnostic. </a:t>
+              <a:t xml:space="preserve">Using the Stack as a Diagnostic. </a:t>
             </a:r>
             <a:pPr indent="0" marL="0">
               <a:lnSpc>
@@ -8054,7 +8069,7 @@
                 <a:ea typeface="Arial" pitchFamily="34" charset="-122"/>
                 <a:cs typeface="Arial" pitchFamily="34" charset="-120"/>
               </a:rPr>
-              <a:t>Small Teams Win on Judgment. </a:t>
+              <a:t xml:space="preserve">Small Teams Win on Judgment. </a:t>
             </a:r>
             <a:pPr indent="0" marL="0">
               <a:lnSpc>
@@ -8390,7 +8405,7 @@
                 <a:ea typeface="Arial" pitchFamily="34" charset="-122"/>
                 <a:cs typeface="Arial" pitchFamily="34" charset="-120"/>
               </a:rPr>
-              <a:t>The Quarterly Planning Trap. </a:t>
+              <a:t xml:space="preserve">The Quarterly Planning Trap. </a:t>
             </a:r>
             <a:pPr indent="0" marL="0">
               <a:lnSpc>
@@ -8451,7 +8466,7 @@
                 <a:ea typeface="Arial" pitchFamily="34" charset="-122"/>
                 <a:cs typeface="Arial" pitchFamily="34" charset="-120"/>
               </a:rPr>
-              <a:t>So you do. </a:t>
+              <a:t xml:space="preserve">So you do. </a:t>
             </a:r>
             <a:pPr indent="0" marL="0">
               <a:lnSpc>
@@ -8580,7 +8595,7 @@
                 <a:ea typeface="Arial" pitchFamily="34" charset="-122"/>
                 <a:cs typeface="Arial" pitchFamily="34" charset="-120"/>
               </a:rPr>
-              <a:t>The Cost of Deciding. </a:t>
+              <a:t xml:space="preserve">The Cost of Deciding. </a:t>
             </a:r>
             <a:pPr indent="0" marL="0">
               <a:lnSpc>
@@ -8641,7 +8656,7 @@
                 <a:ea typeface="Arial" pitchFamily="34" charset="-122"/>
                 <a:cs typeface="Arial" pitchFamily="34" charset="-120"/>
               </a:rPr>
-              <a:t>Hidden Costs of Every Feature. </a:t>
+              <a:t xml:space="preserve">Hidden Costs of Every Feature. </a:t>
             </a:r>
             <a:pPr indent="0" marL="0">
               <a:lnSpc>
@@ -8770,7 +8785,7 @@
                 <a:ea typeface="Arial" pitchFamily="34" charset="-122"/>
                 <a:cs typeface="Arial" pitchFamily="34" charset="-120"/>
               </a:rPr>
-              <a:t>The Klarna Cautionary Tale. </a:t>
+              <a:t xml:space="preserve">The Klarna Cautionary Tale. </a:t>
             </a:r>
             <a:pPr indent="0" marL="0">
               <a:lnSpc>
@@ -10033,7 +10048,7 @@
                 <a:ea typeface="Arial" pitchFamily="34" charset="-122"/>
                 <a:cs typeface="Arial" pitchFamily="34" charset="-120"/>
               </a:rPr>
-              <a:t>Shopify's Judgment Policy. </a:t>
+              <a:t xml:space="preserve">Shopify's Judgment Policy. </a:t>
             </a:r>
             <a:pPr indent="0" marL="0">
               <a:lnSpc>
@@ -10576,7 +10591,7 @@
                 <a:ea typeface="Arial" pitchFamily="34" charset="-122"/>
                 <a:cs typeface="Arial" pitchFamily="34" charset="-120"/>
               </a:rPr>
-              <a:t>The Impossible Job Description. </a:t>
+              <a:t xml:space="preserve">The Impossible Job Description. </a:t>
             </a:r>
             <a:pPr indent="0" marL="0">
               <a:lnSpc>
@@ -10740,7 +10755,7 @@
                 <a:ea typeface="Arial" pitchFamily="34" charset="-122"/>
                 <a:cs typeface="Arial" pitchFamily="34" charset="-120"/>
               </a:rPr>
-              <a:t>The Curator. </a:t>
+              <a:t xml:space="preserve">The Curator. </a:t>
             </a:r>
             <a:pPr indent="0" marL="0">
               <a:lnSpc>
@@ -10801,7 +10816,7 @@
                 <a:ea typeface="Arial" pitchFamily="34" charset="-122"/>
                 <a:cs typeface="Arial" pitchFamily="34" charset="-120"/>
               </a:rPr>
-              <a:t>Why Companies Pay for This. </a:t>
+              <a:t xml:space="preserve">Why Companies Pay for This. </a:t>
             </a:r>
             <a:pPr indent="0" marL="0">
               <a:lnSpc>
@@ -10930,7 +10945,7 @@
                 <a:ea typeface="Arial" pitchFamily="34" charset="-122"/>
                 <a:cs typeface="Arial" pitchFamily="34" charset="-120"/>
               </a:rPr>
-              <a:t>The Architect. </a:t>
+              <a:t xml:space="preserve">The Architect. </a:t>
             </a:r>
             <a:pPr indent="0" marL="0">
               <a:lnSpc>
@@ -10991,7 +11006,7 @@
                 <a:ea typeface="Arial" pitchFamily="34" charset="-122"/>
                 <a:cs typeface="Arial" pitchFamily="34" charset="-120"/>
               </a:rPr>
-              <a:t>The Irony of AI in PM. </a:t>
+              <a:t xml:space="preserve">The Irony of AI in PM. </a:t>
             </a:r>
             <a:pPr indent="0" marL="0">
               <a:lnSpc>
@@ -11120,7 +11135,7 @@
                 <a:ea typeface="Arial" pitchFamily="34" charset="-122"/>
                 <a:cs typeface="Arial" pitchFamily="34" charset="-120"/>
               </a:rPr>
-              <a:t>The Operator. </a:t>
+              <a:t xml:space="preserve">The Operator. </a:t>
             </a:r>
             <a:pPr indent="0" marL="0">
               <a:lnSpc>
@@ -11181,7 +11196,7 @@
                 <a:ea typeface="Arial" pitchFamily="34" charset="-122"/>
                 <a:cs typeface="Arial" pitchFamily="34" charset="-120"/>
               </a:rPr>
-              <a:t>The Market Has Decided. </a:t>
+              <a:t xml:space="preserve">The Market Has Decided. </a:t>
             </a:r>
             <a:pPr indent="0" marL="0">
               <a:lnSpc>
@@ -12541,7 +12556,7 @@
                 <a:ea typeface="Arial" pitchFamily="34" charset="-122"/>
                 <a:cs typeface="Arial" pitchFamily="34" charset="-120"/>
               </a:rPr>
-              <a:t>Name the Roles. Staff Them. Stop Pretending. </a:t>
+              <a:t xml:space="preserve">Name the Roles. Staff Them. Stop Pretending. </a:t>
             </a:r>
             <a:pPr indent="0" marL="0">
               <a:lnSpc>
@@ -12877,7 +12892,7 @@
                 <a:ea typeface="Arial" pitchFamily="34" charset="-122"/>
                 <a:cs typeface="Arial" pitchFamily="34" charset="-120"/>
               </a:rPr>
-              <a:t>The Dashboard Illusion. </a:t>
+              <a:t xml:space="preserve">The Dashboard Illusion. </a:t>
             </a:r>
             <a:pPr indent="0" marL="0">
               <a:lnSpc>
@@ -13041,7 +13056,7 @@
                 <a:ea typeface="Arial" pitchFamily="34" charset="-122"/>
                 <a:cs typeface="Arial" pitchFamily="34" charset="-120"/>
               </a:rPr>
-              <a:t>Human Intent Signals: </a:t>
+              <a:t xml:space="preserve">Human Intent Signals: </a:t>
             </a:r>
             <a:pPr indent="0" marL="0">
               <a:lnSpc>
@@ -13102,7 +13117,7 @@
                 <a:ea typeface="Arial" pitchFamily="34" charset="-122"/>
                 <a:cs typeface="Arial" pitchFamily="34" charset="-120"/>
               </a:rPr>
-              <a:t>Agent-Mediated Signals: </a:t>
+              <a:t xml:space="preserve">Agent-Mediated Signals: </a:t>
             </a:r>
             <a:pPr indent="0" marL="0">
               <a:lnSpc>
@@ -13163,7 +13178,7 @@
                 <a:ea typeface="Arial" pitchFamily="34" charset="-122"/>
                 <a:cs typeface="Arial" pitchFamily="34" charset="-120"/>
               </a:rPr>
-              <a:t>Ghost Signals: </a:t>
+              <a:t xml:space="preserve">Ghost Signals: </a:t>
             </a:r>
             <a:pPr indent="0" marL="0">
               <a:lnSpc>
@@ -13292,7 +13307,7 @@
                 <a:ea typeface="Arial" pitchFamily="34" charset="-122"/>
                 <a:cs typeface="Arial" pitchFamily="34" charset="-120"/>
               </a:rPr>
-              <a:t>The Monday Everything Changed. </a:t>
+              <a:t xml:space="preserve">The Monday Everything Changed. </a:t>
             </a:r>
             <a:pPr indent="0" marL="0">
               <a:lnSpc>
@@ -14791,7 +14806,7 @@
                 <a:ea typeface="Arial" pitchFamily="34" charset="-122"/>
                 <a:cs typeface="Arial" pitchFamily="34" charset="-120"/>
               </a:rPr>
-              <a:t>The Pricing Signal Nobody Is Watching. </a:t>
+              <a:t xml:space="preserve">The Pricing Signal Nobody Is Watching. </a:t>
             </a:r>
             <a:pPr indent="0" marL="0">
               <a:lnSpc>
@@ -15127,7 +15142,7 @@
                 <a:ea typeface="Arial" pitchFamily="34" charset="-122"/>
                 <a:cs typeface="Arial" pitchFamily="34" charset="-120"/>
               </a:rPr>
-              <a:t>The End of Articulated Needs. </a:t>
+              <a:t xml:space="preserve">The End of Articulated Needs. </a:t>
             </a:r>
             <a:pPr indent="0" marL="0">
               <a:lnSpc>
@@ -15291,7 +15306,7 @@
                 <a:ea typeface="Arial" pitchFamily="34" charset="-122"/>
                 <a:cs typeface="Arial" pitchFamily="34" charset="-120"/>
               </a:rPr>
-              <a:t>The Prototype Before You Ask Loop. </a:t>
+              <a:t xml:space="preserve">The Prototype Before You Ask Loop. </a:t>
             </a:r>
             <a:pPr indent="0" marL="0">
               <a:lnSpc>
@@ -15352,7 +15367,7 @@
                 <a:ea typeface="Arial" pitchFamily="34" charset="-122"/>
                 <a:cs typeface="Arial" pitchFamily="34" charset="-120"/>
               </a:rPr>
-              <a:t>The Closed-Loop Trap. </a:t>
+              <a:t xml:space="preserve">The Closed-Loop Trap. </a:t>
             </a:r>
             <a:pPr indent="0" marL="0">
               <a:lnSpc>
@@ -15481,7 +15496,7 @@
                 <a:ea typeface="Arial" pitchFamily="34" charset="-122"/>
                 <a:cs typeface="Arial" pitchFamily="34" charset="-120"/>
               </a:rPr>
-              <a:t>Monday: Build Three Prototypes. </a:t>
+              <a:t xml:space="preserve">Monday: Build Three Prototypes. </a:t>
             </a:r>
             <a:pPr indent="0" marL="0">
               <a:lnSpc>
@@ -15542,7 +15557,7 @@
                 <a:ea typeface="Arial" pitchFamily="34" charset="-122"/>
                 <a:cs typeface="Arial" pitchFamily="34" charset="-120"/>
               </a:rPr>
-              <a:t>Tuesday to Wednesday: Show, Don't Ask. </a:t>
+              <a:t xml:space="preserve">Tuesday to Wednesday: Show, Don't Ask. </a:t>
             </a:r>
             <a:pPr indent="0" marL="0">
               <a:lnSpc>
@@ -15603,7 +15618,7 @@
                 <a:ea typeface="Arial" pitchFamily="34" charset="-122"/>
                 <a:cs typeface="Arial" pitchFamily="34" charset="-120"/>
               </a:rPr>
-              <a:t>Thursday to Friday: Synthesize and Kill. </a:t>
+              <a:t xml:space="preserve">Thursday to Friday: Synthesize and Kill. </a:t>
             </a:r>
             <a:pPr indent="0" marL="0">
               <a:lnSpc>
@@ -15939,7 +15954,7 @@
                 <a:ea typeface="Arial" pitchFamily="34" charset="-122"/>
                 <a:cs typeface="Arial" pitchFamily="34" charset="-120"/>
               </a:rPr>
-              <a:t>The Agent Question. </a:t>
+              <a:t xml:space="preserve">The Agent Question. </a:t>
             </a:r>
             <a:pPr indent="0" marL="0">
               <a:lnSpc>
@@ -16844,7 +16859,7 @@
                 <a:ea typeface="Arial" pitchFamily="34" charset="-122"/>
                 <a:cs typeface="Arial" pitchFamily="34" charset="-120"/>
               </a:rPr>
-              <a:t>The Trust Cost Nobody Talks About. </a:t>
+              <a:t xml:space="preserve">The Trust Cost Nobody Talks About. </a:t>
             </a:r>
             <a:pPr indent="0" marL="0">
               <a:lnSpc>
@@ -16905,7 +16920,7 @@
                 <a:ea typeface="Arial" pitchFamily="34" charset="-122"/>
                 <a:cs typeface="Arial" pitchFamily="34" charset="-120"/>
               </a:rPr>
-              <a:t>The Cursor Incident. </a:t>
+              <a:t xml:space="preserve">The Cursor Incident. </a:t>
             </a:r>
             <a:pPr indent="0" marL="0">
               <a:lnSpc>
@@ -17034,7 +17049,7 @@
                 <a:ea typeface="Arial" pitchFamily="34" charset="-122"/>
                 <a:cs typeface="Arial" pitchFamily="34" charset="-120"/>
               </a:rPr>
-              <a:t>Welcome to Product Management in 2026. </a:t>
+              <a:t xml:space="preserve">Welcome to Product Management in 2026. </a:t>
             </a:r>
             <a:pPr indent="0" marL="0">
               <a:lnSpc>
@@ -17095,7 +17110,7 @@
                 <a:ea typeface="Arial" pitchFamily="34" charset="-122"/>
                 <a:cs typeface="Arial" pitchFamily="34" charset="-120"/>
               </a:rPr>
-              <a:t>But here's what nobody warned you about: </a:t>
+              <a:t xml:space="preserve">But here's what nobody warned you about: </a:t>
             </a:r>
             <a:pPr indent="0" marL="0">
               <a:lnSpc>
@@ -17414,7 +17429,7 @@
                 <a:ea typeface="Arial" pitchFamily="34" charset="-122"/>
                 <a:cs typeface="Arial" pitchFamily="34" charset="-120"/>
               </a:rPr>
-              <a:t>The Incident Nobody Prepared For. </a:t>
+              <a:t xml:space="preserve">The Incident Nobody Prepared For. </a:t>
             </a:r>
             <a:pPr indent="0" marL="0">
               <a:lnSpc>
@@ -17578,7 +17593,7 @@
                 <a:ea typeface="Arial" pitchFamily="34" charset="-122"/>
                 <a:cs typeface="Arial" pitchFamily="34" charset="-120"/>
               </a:rPr>
-              <a:t>Governance as Competitive Moat. </a:t>
+              <a:t xml:space="preserve">Governance as Competitive Moat. </a:t>
             </a:r>
             <a:pPr indent="0" marL="0">
               <a:lnSpc>
@@ -17639,7 +17654,7 @@
                 <a:ea typeface="Arial" pitchFamily="34" charset="-122"/>
                 <a:cs typeface="Arial" pitchFamily="34" charset="-120"/>
               </a:rPr>
-              <a:t>EY and Credo AI Were Right. </a:t>
+              <a:t xml:space="preserve">EY and Credo AI Were Right. </a:t>
             </a:r>
             <a:pPr indent="0" marL="0">
               <a:lnSpc>
@@ -17768,7 +17783,7 @@
                 <a:ea typeface="Arial" pitchFamily="34" charset="-122"/>
                 <a:cs typeface="Arial" pitchFamily="34" charset="-120"/>
               </a:rPr>
-              <a:t>Training Data Provenance. </a:t>
+              <a:t xml:space="preserve">Training Data Provenance. </a:t>
             </a:r>
             <a:pPr indent="0" marL="0">
               <a:lnSpc>
@@ -17829,7 +17844,7 @@
                 <a:ea typeface="Arial" pitchFamily="34" charset="-122"/>
                 <a:cs typeface="Arial" pitchFamily="34" charset="-120"/>
               </a:rPr>
-              <a:t>Output Boundaries. </a:t>
+              <a:t xml:space="preserve">Output Boundaries. </a:t>
             </a:r>
             <a:pPr indent="0" marL="0">
               <a:lnSpc>
@@ -17890,7 +17905,7 @@
                 <a:ea typeface="Arial" pitchFamily="34" charset="-122"/>
                 <a:cs typeface="Arial" pitchFamily="34" charset="-120"/>
               </a:rPr>
-              <a:t>Escalation Paths and Rollback Authority. </a:t>
+              <a:t xml:space="preserve">Escalation Paths and Rollback Authority. </a:t>
             </a:r>
             <a:pPr indent="0" marL="0">
               <a:lnSpc>
@@ -19579,7 +19594,7 @@
                 <a:ea typeface="Arial" pitchFamily="34" charset="-122"/>
                 <a:cs typeface="Arial" pitchFamily="34" charset="-120"/>
               </a:rPr>
-              <a:t>The Tuesday Morning Problem. </a:t>
+              <a:t xml:space="preserve">The Tuesday Morning Problem. </a:t>
             </a:r>
             <a:pPr indent="0" marL="0">
               <a:lnSpc>
@@ -19743,7 +19758,7 @@
                 <a:ea typeface="Arial" pitchFamily="34" charset="-122"/>
                 <a:cs typeface="Arial" pitchFamily="34" charset="-120"/>
               </a:rPr>
-              <a:t>The Dual-Loop Operating Model. </a:t>
+              <a:t xml:space="preserve">The Dual-Loop Operating Model. </a:t>
             </a:r>
             <a:pPr indent="0" marL="0">
               <a:lnSpc>
@@ -19804,7 +19819,7 @@
                 <a:ea typeface="Arial" pitchFamily="34" charset="-122"/>
                 <a:cs typeface="Arial" pitchFamily="34" charset="-120"/>
               </a:rPr>
-              <a:t>Loop 1 (Fast): </a:t>
+              <a:t xml:space="preserve">Loop 1 (Fast): </a:t>
             </a:r>
             <a:pPr indent="0" marL="0">
               <a:lnSpc>
@@ -19865,7 +19880,7 @@
                 <a:ea typeface="Arial" pitchFamily="34" charset="-122"/>
                 <a:cs typeface="Arial" pitchFamily="34" charset="-120"/>
               </a:rPr>
-              <a:t>Loop 2 (Slow): </a:t>
+              <a:t xml:space="preserve">Loop 2 (Slow): </a:t>
             </a:r>
             <a:pPr indent="0" marL="0">
               <a:lnSpc>
@@ -21364,7 +21379,7 @@
                 <a:ea typeface="Arial" pitchFamily="34" charset="-122"/>
                 <a:cs typeface="Arial" pitchFamily="34" charset="-120"/>
               </a:rPr>
-              <a:t>The Kill Review. </a:t>
+              <a:t xml:space="preserve">The Kill Review. </a:t>
             </a:r>
             <a:pPr indent="0" marL="0">
               <a:lnSpc>
@@ -21425,7 +21440,7 @@
                 <a:ea typeface="Arial" pitchFamily="34" charset="-122"/>
                 <a:cs typeface="Arial" pitchFamily="34" charset="-120"/>
               </a:rPr>
-              <a:t>The Signal Standup. </a:t>
+              <a:t xml:space="preserve">The Signal Standup. </a:t>
             </a:r>
             <a:pPr indent="0" marL="0">
               <a:lnSpc>
@@ -21554,7 +21569,7 @@
                 <a:ea typeface="Arial" pitchFamily="34" charset="-122"/>
                 <a:cs typeface="Arial" pitchFamily="34" charset="-120"/>
               </a:rPr>
-              <a:t>The AI Productivity Paradox. </a:t>
+              <a:t xml:space="preserve">The AI Productivity Paradox. </a:t>
             </a:r>
             <a:pPr indent="0" marL="0">
               <a:lnSpc>
@@ -21615,7 +21630,7 @@
                 <a:ea typeface="Arial" pitchFamily="34" charset="-122"/>
                 <a:cs typeface="Arial" pitchFamily="34" charset="-120"/>
               </a:rPr>
-              <a:t>Here's the part that stings: </a:t>
+              <a:t xml:space="preserve">Here's the part that stings: </a:t>
             </a:r>
             <a:pPr indent="0" marL="0">
               <a:lnSpc>
@@ -21744,7 +21759,7 @@
                 <a:ea typeface="Arial" pitchFamily="34" charset="-122"/>
                 <a:cs typeface="Arial" pitchFamily="34" charset="-120"/>
               </a:rPr>
-              <a:t>The Bet Board. </a:t>
+              <a:t xml:space="preserve">The Bet Board. </a:t>
             </a:r>
             <a:pPr indent="0" marL="0">
               <a:lnSpc>
@@ -22098,7 +22113,7 @@
                 <a:ea typeface="Arial" pitchFamily="34" charset="-122"/>
                 <a:cs typeface="Arial" pitchFamily="34" charset="-120"/>
               </a:rPr>
-              <a:t>The Conversation Nobody Wants to Have. </a:t>
+              <a:t xml:space="preserve">The Conversation Nobody Wants to Have. </a:t>
             </a:r>
             <a:pPr indent="0" marL="0">
               <a:lnSpc>
@@ -22159,7 +22174,7 @@
                 <a:ea typeface="Arial" pitchFamily="34" charset="-122"/>
                 <a:cs typeface="Arial" pitchFamily="34" charset="-120"/>
               </a:rPr>
-              <a:t>AI Is Already Better at the Second List. </a:t>
+              <a:t xml:space="preserve">AI Is Already Better at the Second List. </a:t>
             </a:r>
             <a:pPr indent="0" marL="0">
               <a:lnSpc>
@@ -24341,7 +24356,7 @@
                 <a:ea typeface="Arial" pitchFamily="34" charset="-122"/>
                 <a:cs typeface="Arial" pitchFamily="34" charset="-120"/>
               </a:rPr>
-              <a:t>The Polarization of the PM Market. </a:t>
+              <a:t xml:space="preserve">The Polarization of the PM Market. </a:t>
             </a:r>
             <a:pPr indent="0" marL="0">
               <a:lnSpc>
@@ -24505,7 +24520,7 @@
                 <a:ea typeface="Arial" pitchFamily="34" charset="-122"/>
                 <a:cs typeface="Arial" pitchFamily="34" charset="-120"/>
               </a:rPr>
-              <a:t>The Honest Career Conversation. </a:t>
+              <a:t xml:space="preserve">The Honest Career Conversation. </a:t>
             </a:r>
             <a:pPr indent="0" marL="0">
               <a:lnSpc>
@@ -24876,7 +24891,7 @@
                 <a:ea typeface="Arial" pitchFamily="34" charset="-122"/>
                 <a:cs typeface="Arial" pitchFamily="34" charset="-120"/>
               </a:rPr>
-              <a:t>Starting This Week. </a:t>
+              <a:t xml:space="preserve">Starting This Week. </a:t>
             </a:r>
             <a:pPr indent="0" marL="0">
               <a:lnSpc>
@@ -24937,7 +24952,7 @@
                 <a:ea typeface="Arial" pitchFamily="34" charset="-122"/>
                 <a:cs typeface="Arial" pitchFamily="34" charset="-120"/>
               </a:rPr>
-              <a:t>Who This Sprint Is For. </a:t>
+              <a:t xml:space="preserve">Who This Sprint Is For. </a:t>
             </a:r>
             <a:pPr indent="0" marL="0">
               <a:lnSpc>
@@ -25066,7 +25081,7 @@
                 <a:ea typeface="Arial" pitchFamily="34" charset="-122"/>
                 <a:cs typeface="Arial" pitchFamily="34" charset="-120"/>
               </a:rPr>
-              <a:t>Days 1 to 10: Diagnose. </a:t>
+              <a:t xml:space="preserve">Days 1 to 10: Diagnose. </a:t>
             </a:r>
             <a:pPr indent="0" marL="0">
               <a:lnSpc>
@@ -25127,7 +25142,7 @@
                 <a:ea typeface="Arial" pitchFamily="34" charset="-122"/>
                 <a:cs typeface="Arial" pitchFamily="34" charset="-120"/>
               </a:rPr>
-              <a:t>Audit Your Metrics for AI Noise. </a:t>
+              <a:t xml:space="preserve">Audit Your Metrics for AI Noise. </a:t>
             </a:r>
             <a:pPr indent="0" marL="0">
               <a:lnSpc>
@@ -25188,7 +25203,7 @@
                 <a:ea typeface="Arial" pitchFamily="34" charset="-122"/>
                 <a:cs typeface="Arial" pitchFamily="34" charset="-120"/>
               </a:rPr>
-              <a:t>Find the Dead Feature. </a:t>
+              <a:t xml:space="preserve">Find the Dead Feature. </a:t>
             </a:r>
             <a:pPr indent="0" marL="0">
               <a:lnSpc>
@@ -25317,7 +25332,7 @@
                 <a:ea typeface="Arial" pitchFamily="34" charset="-122"/>
                 <a:cs typeface="Arial" pitchFamily="34" charset="-120"/>
               </a:rPr>
-              <a:t>Days 11 to 30: Restructure. </a:t>
+              <a:t xml:space="preserve">Days 11 to 30: Restructure. </a:t>
             </a:r>
             <a:pPr indent="0" marL="0">
               <a:lnSpc>
@@ -25378,7 +25393,7 @@
                 <a:ea typeface="Arial" pitchFamily="34" charset="-122"/>
                 <a:cs typeface="Arial" pitchFamily="34" charset="-120"/>
               </a:rPr>
-              <a:t>Launch the Kill Review. </a:t>
+              <a:t xml:space="preserve">Launch the Kill Review. </a:t>
             </a:r>
             <a:pPr indent="0" marL="0">
               <a:lnSpc>
@@ -25439,7 +25454,7 @@
                 <a:ea typeface="Arial" pitchFamily="34" charset="-122"/>
                 <a:cs typeface="Arial" pitchFamily="34" charset="-120"/>
               </a:rPr>
-              <a:t>Name the Three PMs and Convert Your Roadmap. </a:t>
+              <a:t xml:space="preserve">Name the Three PMs and Convert Your Roadmap. </a:t>
             </a:r>
             <a:pPr indent="0" marL="0">
               <a:lnSpc>
@@ -25568,7 +25583,7 @@
                 <a:ea typeface="Arial" pitchFamily="34" charset="-122"/>
                 <a:cs typeface="Arial" pitchFamily="34" charset="-120"/>
               </a:rPr>
-              <a:t>This Playbook Is About the New Job. </a:t>
+              <a:t xml:space="preserve">This Playbook Is About the New Job. </a:t>
             </a:r>
             <a:pPr indent="0" marL="0">
               <a:lnSpc>
@@ -25629,7 +25644,7 @@
                 <a:ea typeface="Arial" pitchFamily="34" charset="-122"/>
                 <a:cs typeface="Arial" pitchFamily="34" charset="-120"/>
               </a:rPr>
-              <a:t>What Actually Changed. and What Didn't. </a:t>
+              <a:t xml:space="preserve">What Actually Changed. and What Didn't. </a:t>
             </a:r>
             <a:pPr indent="0" marL="0">
               <a:lnSpc>
@@ -25758,7 +25773,7 @@
                 <a:ea typeface="Arial" pitchFamily="34" charset="-122"/>
                 <a:cs typeface="Arial" pitchFamily="34" charset="-120"/>
               </a:rPr>
-              <a:t>Days 31 to 50: Instrument. </a:t>
+              <a:t xml:space="preserve">Days 31 to 50: Instrument. </a:t>
             </a:r>
             <a:pPr indent="0" marL="0">
               <a:lnSpc>
@@ -25819,7 +25834,7 @@
                 <a:ea typeface="Arial" pitchFamily="34" charset="-122"/>
                 <a:cs typeface="Arial" pitchFamily="34" charset="-120"/>
               </a:rPr>
-              <a:t>Set Up AI Output Review. </a:t>
+              <a:t xml:space="preserve">Set Up AI Output Review. </a:t>
             </a:r>
             <a:pPr indent="0" marL="0">
               <a:lnSpc>
@@ -25880,7 +25895,7 @@
                 <a:ea typeface="Arial" pitchFamily="34" charset="-122"/>
                 <a:cs typeface="Arial" pitchFamily="34" charset="-120"/>
               </a:rPr>
-              <a:t>Run One Prototype Before You Ask Cycle. </a:t>
+              <a:t xml:space="preserve">Run One Prototype Before You Ask Cycle. </a:t>
             </a:r>
             <a:pPr indent="0" marL="0">
               <a:lnSpc>
@@ -26009,7 +26024,7 @@
                 <a:ea typeface="Arial" pitchFamily="34" charset="-122"/>
                 <a:cs typeface="Arial" pitchFamily="34" charset="-120"/>
               </a:rPr>
-              <a:t>Days 51 to 60: Lock In. </a:t>
+              <a:t xml:space="preserve">Days 51 to 60: Lock In. </a:t>
             </a:r>
             <a:pPr indent="0" marL="0">
               <a:lnSpc>
@@ -26070,7 +26085,7 @@
                 <a:ea typeface="Arial" pitchFamily="34" charset="-122"/>
                 <a:cs typeface="Arial" pitchFamily="34" charset="-120"/>
               </a:rPr>
-              <a:t>Present the Dual-Loop Operating Model. </a:t>
+              <a:t xml:space="preserve">Present the Dual-Loop Operating Model. </a:t>
             </a:r>
             <a:pPr indent="0" marL="0">
               <a:lnSpc>
@@ -26131,7 +26146,7 @@
                 <a:ea typeface="Arial" pitchFamily="34" charset="-122"/>
                 <a:cs typeface="Arial" pitchFamily="34" charset="-120"/>
               </a:rPr>
-              <a:t>Set 90-Day Targets. </a:t>
+              <a:t xml:space="preserve">Set 90-Day Targets. </a:t>
             </a:r>
             <a:pPr indent="0" marL="0">
               <a:lnSpc>
@@ -26573,7 +26588,7 @@
                 <a:ea typeface="Arial" pitchFamily="34" charset="-122"/>
                 <a:cs typeface="Arial" pitchFamily="34" charset="-120"/>
               </a:rPr>
-              <a:t>The Competitive Scenario. </a:t>
+              <a:t xml:space="preserve">The Competitive Scenario. </a:t>
             </a:r>
             <a:pPr indent="0" marL="0">
               <a:lnSpc>
@@ -26702,7 +26717,7 @@
                 <a:ea typeface="Arial" pitchFamily="34" charset="-122"/>
                 <a:cs typeface="Arial" pitchFamily="34" charset="-120"/>
               </a:rPr>
-              <a:t>The Talent Scenario. </a:t>
+              <a:t xml:space="preserve">The Talent Scenario. </a:t>
             </a:r>
             <a:pPr indent="0" marL="0">
               <a:lnSpc>
@@ -26763,7 +26778,7 @@
                 <a:ea typeface="Arial" pitchFamily="34" charset="-122"/>
                 <a:cs typeface="Arial" pitchFamily="34" charset="-120"/>
               </a:rPr>
-              <a:t>The Migration Has Started. </a:t>
+              <a:t xml:space="preserve">The Migration Has Started. </a:t>
             </a:r>
             <a:pPr indent="0" marL="0">
               <a:lnSpc>
@@ -26892,7 +26907,7 @@
                 <a:ea typeface="Arial" pitchFamily="34" charset="-122"/>
                 <a:cs typeface="Arial" pitchFamily="34" charset="-120"/>
               </a:rPr>
-              <a:t>The Product Scenario. </a:t>
+              <a:t xml:space="preserve">The Product Scenario. </a:t>
             </a:r>
             <a:pPr indent="0" marL="0">
               <a:lnSpc>
@@ -27519,7 +27534,7 @@
                 <a:ea typeface="Arial" pitchFamily="34" charset="-122"/>
                 <a:cs typeface="Arial" pitchFamily="34" charset="-120"/>
               </a:rPr>
-              <a:t>The Choice. </a:t>
+              <a:t xml:space="preserve">The Choice. </a:t>
             </a:r>
             <a:pPr indent="0" marL="0">
               <a:lnSpc>
@@ -27789,7 +27804,7 @@
                 <a:ea typeface="Arial" pitchFamily="34" charset="-122"/>
                 <a:cs typeface="Arial" pitchFamily="34" charset="-120"/>
               </a:rPr>
-              <a:t>What Didn't Change Is What Matters. </a:t>
+              <a:t xml:space="preserve">What Didn't Change Is What Matters. </a:t>
             </a:r>
             <a:pPr indent="0" marL="0">
               <a:lnSpc>

</xml_diff>